<commit_message>
working script and presentation
</commit_message>
<xml_diff>
--- a/four_leaf_clover_presentation.pptx
+++ b/four_leaf_clover_presentation.pptx
@@ -5,16 +5,16 @@
     <p:sldMasterId id="2147483648" r:id="rId1"/>
   </p:sldMasterIdLst>
   <p:sldIdLst>
-    <p:sldId id="256" r:id="rId7"/>
-    <p:sldId id="257" r:id="rId8"/>
-    <p:sldId id="258" r:id="rId9"/>
-    <p:sldId id="259" r:id="rId10"/>
-    <p:sldId id="260" r:id="rId11"/>
-    <p:sldId id="261" r:id="rId12"/>
-    <p:sldId id="262" r:id="rId13"/>
-    <p:sldId id="263" r:id="rId14"/>
-    <p:sldId id="264" r:id="rId15"/>
-    <p:sldId id="265" r:id="rId16"/>
+    <p:sldId id="256" r:id="rId2"/>
+    <p:sldId id="257" r:id="rId3"/>
+    <p:sldId id="258" r:id="rId4"/>
+    <p:sldId id="259" r:id="rId5"/>
+    <p:sldId id="260" r:id="rId6"/>
+    <p:sldId id="261" r:id="rId7"/>
+    <p:sldId id="262" r:id="rId8"/>
+    <p:sldId id="263" r:id="rId9"/>
+    <p:sldId id="264" r:id="rId10"/>
+    <p:sldId id="265" r:id="rId11"/>
   </p:sldIdLst>
   <p:sldSz cx="9144000" cy="6858000" type="screen4x3"/>
   <p:notesSz cx="6858000" cy="9144000"/>
@@ -113,6 +113,22 @@
       </a:defRPr>
     </a:lvl9pPr>
   </p:defaultTextStyle>
+  <p:extLst>
+    <p:ext uri="{EFAFB233-063F-42B5-8137-9DF3F51BA10A}">
+      <p15:sldGuideLst xmlns:p15="http://schemas.microsoft.com/office/powerpoint/2012/main">
+        <p15:guide id="1" orient="horz" pos="2160">
+          <p15:clr>
+            <a:srgbClr val="A4A3A4"/>
+          </p15:clr>
+        </p15:guide>
+        <p15:guide id="2" pos="2880">
+          <p15:clr>
+            <a:srgbClr val="A4A3A4"/>
+          </p15:clr>
+        </p15:guide>
+      </p15:sldGuideLst>
+    </p:ext>
+  </p:extLst>
 </p:presentation>
 </file>
 
@@ -154,10 +170,9 @@
           <a:lstStyle/>
           <a:p>
             <a:r>
-              <a:rPr lang="en-US" smtClean="0"/>
+              <a:rPr lang="en-US"/>
               <a:t>Click to edit Master title style</a:t>
             </a:r>
-            <a:endParaRPr lang="en-US"/>
           </a:p>
         </p:txBody>
       </p:sp>
@@ -273,10 +288,9 @@
           </a:lstStyle>
           <a:p>
             <a:r>
-              <a:rPr lang="en-US" smtClean="0"/>
+              <a:rPr lang="en-US"/>
               <a:t>Click to edit Master subtitle style</a:t>
             </a:r>
-            <a:endParaRPr lang="en-US"/>
           </a:p>
         </p:txBody>
       </p:sp>
@@ -297,7 +311,7 @@
           <a:p>
             <a:fld id="{5BCAD085-E8A6-8845-BD4E-CB4CCA059FC4}" type="datetimeFigureOut">
               <a:rPr lang="en-US" smtClean="0"/>
-              <a:t>1/27/13</a:t>
+              <a:t>6/10/24</a:t>
             </a:fld>
             <a:endParaRPr lang="en-US"/>
           </a:p>
@@ -391,10 +405,9 @@
           <a:lstStyle/>
           <a:p>
             <a:r>
-              <a:rPr lang="en-US" smtClean="0"/>
+              <a:rPr lang="en-US"/>
               <a:t>Click to edit Master title style</a:t>
             </a:r>
-            <a:endParaRPr lang="en-US"/>
           </a:p>
         </p:txBody>
       </p:sp>
@@ -415,38 +428,37 @@
           <a:p>
             <a:pPr lvl="0"/>
             <a:r>
-              <a:rPr lang="en-US" smtClean="0"/>
+              <a:rPr lang="en-US"/>
               <a:t>Click to edit Master text styles</a:t>
             </a:r>
           </a:p>
           <a:p>
             <a:pPr lvl="1"/>
             <a:r>
-              <a:rPr lang="en-US" smtClean="0"/>
+              <a:rPr lang="en-US"/>
               <a:t>Second level</a:t>
             </a:r>
           </a:p>
           <a:p>
             <a:pPr lvl="2"/>
             <a:r>
-              <a:rPr lang="en-US" smtClean="0"/>
+              <a:rPr lang="en-US"/>
               <a:t>Third level</a:t>
             </a:r>
           </a:p>
           <a:p>
             <a:pPr lvl="3"/>
             <a:r>
-              <a:rPr lang="en-US" smtClean="0"/>
+              <a:rPr lang="en-US"/>
               <a:t>Fourth level</a:t>
             </a:r>
           </a:p>
           <a:p>
             <a:pPr lvl="4"/>
             <a:r>
-              <a:rPr lang="en-US" smtClean="0"/>
+              <a:rPr lang="en-US"/>
               <a:t>Fifth level</a:t>
             </a:r>
-            <a:endParaRPr lang="en-US"/>
           </a:p>
         </p:txBody>
       </p:sp>
@@ -467,7 +479,7 @@
           <a:p>
             <a:fld id="{5BCAD085-E8A6-8845-BD4E-CB4CCA059FC4}" type="datetimeFigureOut">
               <a:rPr lang="en-US" smtClean="0"/>
-              <a:t>1/27/13</a:t>
+              <a:t>6/10/24</a:t>
             </a:fld>
             <a:endParaRPr lang="en-US"/>
           </a:p>
@@ -566,10 +578,9 @@
           <a:lstStyle/>
           <a:p>
             <a:r>
-              <a:rPr lang="en-US" smtClean="0"/>
+              <a:rPr lang="en-US"/>
               <a:t>Click to edit Master title style</a:t>
             </a:r>
-            <a:endParaRPr lang="en-US"/>
           </a:p>
         </p:txBody>
       </p:sp>
@@ -595,38 +606,37 @@
           <a:p>
             <a:pPr lvl="0"/>
             <a:r>
-              <a:rPr lang="en-US" smtClean="0"/>
+              <a:rPr lang="en-US"/>
               <a:t>Click to edit Master text styles</a:t>
             </a:r>
           </a:p>
           <a:p>
             <a:pPr lvl="1"/>
             <a:r>
-              <a:rPr lang="en-US" smtClean="0"/>
+              <a:rPr lang="en-US"/>
               <a:t>Second level</a:t>
             </a:r>
           </a:p>
           <a:p>
             <a:pPr lvl="2"/>
             <a:r>
-              <a:rPr lang="en-US" smtClean="0"/>
+              <a:rPr lang="en-US"/>
               <a:t>Third level</a:t>
             </a:r>
           </a:p>
           <a:p>
             <a:pPr lvl="3"/>
             <a:r>
-              <a:rPr lang="en-US" smtClean="0"/>
+              <a:rPr lang="en-US"/>
               <a:t>Fourth level</a:t>
             </a:r>
           </a:p>
           <a:p>
             <a:pPr lvl="4"/>
             <a:r>
-              <a:rPr lang="en-US" smtClean="0"/>
+              <a:rPr lang="en-US"/>
               <a:t>Fifth level</a:t>
             </a:r>
-            <a:endParaRPr lang="en-US"/>
           </a:p>
         </p:txBody>
       </p:sp>
@@ -647,7 +657,7 @@
           <a:p>
             <a:fld id="{5BCAD085-E8A6-8845-BD4E-CB4CCA059FC4}" type="datetimeFigureOut">
               <a:rPr lang="en-US" smtClean="0"/>
-              <a:t>1/27/13</a:t>
+              <a:t>6/10/24</a:t>
             </a:fld>
             <a:endParaRPr lang="en-US"/>
           </a:p>
@@ -741,10 +751,9 @@
           <a:lstStyle/>
           <a:p>
             <a:r>
-              <a:rPr lang="en-US" smtClean="0"/>
+              <a:rPr lang="en-US"/>
               <a:t>Click to edit Master title style</a:t>
             </a:r>
-            <a:endParaRPr lang="en-US"/>
           </a:p>
         </p:txBody>
       </p:sp>
@@ -765,38 +774,37 @@
           <a:p>
             <a:pPr lvl="0"/>
             <a:r>
-              <a:rPr lang="en-US" smtClean="0"/>
+              <a:rPr lang="en-US"/>
               <a:t>Click to edit Master text styles</a:t>
             </a:r>
           </a:p>
           <a:p>
             <a:pPr lvl="1"/>
             <a:r>
-              <a:rPr lang="en-US" smtClean="0"/>
+              <a:rPr lang="en-US"/>
               <a:t>Second level</a:t>
             </a:r>
           </a:p>
           <a:p>
             <a:pPr lvl="2"/>
             <a:r>
-              <a:rPr lang="en-US" smtClean="0"/>
+              <a:rPr lang="en-US"/>
               <a:t>Third level</a:t>
             </a:r>
           </a:p>
           <a:p>
             <a:pPr lvl="3"/>
             <a:r>
-              <a:rPr lang="en-US" smtClean="0"/>
+              <a:rPr lang="en-US"/>
               <a:t>Fourth level</a:t>
             </a:r>
           </a:p>
           <a:p>
             <a:pPr lvl="4"/>
             <a:r>
-              <a:rPr lang="en-US" smtClean="0"/>
+              <a:rPr lang="en-US"/>
               <a:t>Fifth level</a:t>
             </a:r>
-            <a:endParaRPr lang="en-US"/>
           </a:p>
         </p:txBody>
       </p:sp>
@@ -817,7 +825,7 @@
           <a:p>
             <a:fld id="{5BCAD085-E8A6-8845-BD4E-CB4CCA059FC4}" type="datetimeFigureOut">
               <a:rPr lang="en-US" smtClean="0"/>
-              <a:t>1/27/13</a:t>
+              <a:t>6/10/24</a:t>
             </a:fld>
             <a:endParaRPr lang="en-US"/>
           </a:p>
@@ -920,10 +928,9 @@
           </a:lstStyle>
           <a:p>
             <a:r>
-              <a:rPr lang="en-US" smtClean="0"/>
+              <a:rPr lang="en-US"/>
               <a:t>Click to edit Master title style</a:t>
             </a:r>
-            <a:endParaRPr lang="en-US"/>
           </a:p>
         </p:txBody>
       </p:sp>
@@ -1040,7 +1047,7 @@
           <a:p>
             <a:pPr lvl="0"/>
             <a:r>
-              <a:rPr lang="en-US" smtClean="0"/>
+              <a:rPr lang="en-US"/>
               <a:t>Click to edit Master text styles</a:t>
             </a:r>
           </a:p>
@@ -1063,7 +1070,7 @@
           <a:p>
             <a:fld id="{5BCAD085-E8A6-8845-BD4E-CB4CCA059FC4}" type="datetimeFigureOut">
               <a:rPr lang="en-US" smtClean="0"/>
-              <a:t>1/27/13</a:t>
+              <a:t>6/10/24</a:t>
             </a:fld>
             <a:endParaRPr lang="en-US"/>
           </a:p>
@@ -1157,10 +1164,9 @@
           <a:lstStyle/>
           <a:p>
             <a:r>
-              <a:rPr lang="en-US" smtClean="0"/>
+              <a:rPr lang="en-US"/>
               <a:t>Click to edit Master title style</a:t>
             </a:r>
-            <a:endParaRPr lang="en-US"/>
           </a:p>
         </p:txBody>
       </p:sp>
@@ -1214,38 +1220,37 @@
           <a:p>
             <a:pPr lvl="0"/>
             <a:r>
-              <a:rPr lang="en-US" smtClean="0"/>
+              <a:rPr lang="en-US"/>
               <a:t>Click to edit Master text styles</a:t>
             </a:r>
           </a:p>
           <a:p>
             <a:pPr lvl="1"/>
             <a:r>
-              <a:rPr lang="en-US" smtClean="0"/>
+              <a:rPr lang="en-US"/>
               <a:t>Second level</a:t>
             </a:r>
           </a:p>
           <a:p>
             <a:pPr lvl="2"/>
             <a:r>
-              <a:rPr lang="en-US" smtClean="0"/>
+              <a:rPr lang="en-US"/>
               <a:t>Third level</a:t>
             </a:r>
           </a:p>
           <a:p>
             <a:pPr lvl="3"/>
             <a:r>
-              <a:rPr lang="en-US" smtClean="0"/>
+              <a:rPr lang="en-US"/>
               <a:t>Fourth level</a:t>
             </a:r>
           </a:p>
           <a:p>
             <a:pPr lvl="4"/>
             <a:r>
-              <a:rPr lang="en-US" smtClean="0"/>
+              <a:rPr lang="en-US"/>
               <a:t>Fifth level</a:t>
             </a:r>
-            <a:endParaRPr lang="en-US"/>
           </a:p>
         </p:txBody>
       </p:sp>
@@ -1299,38 +1304,37 @@
           <a:p>
             <a:pPr lvl="0"/>
             <a:r>
-              <a:rPr lang="en-US" smtClean="0"/>
+              <a:rPr lang="en-US"/>
               <a:t>Click to edit Master text styles</a:t>
             </a:r>
           </a:p>
           <a:p>
             <a:pPr lvl="1"/>
             <a:r>
-              <a:rPr lang="en-US" smtClean="0"/>
+              <a:rPr lang="en-US"/>
               <a:t>Second level</a:t>
             </a:r>
           </a:p>
           <a:p>
             <a:pPr lvl="2"/>
             <a:r>
-              <a:rPr lang="en-US" smtClean="0"/>
+              <a:rPr lang="en-US"/>
               <a:t>Third level</a:t>
             </a:r>
           </a:p>
           <a:p>
             <a:pPr lvl="3"/>
             <a:r>
-              <a:rPr lang="en-US" smtClean="0"/>
+              <a:rPr lang="en-US"/>
               <a:t>Fourth level</a:t>
             </a:r>
           </a:p>
           <a:p>
             <a:pPr lvl="4"/>
             <a:r>
-              <a:rPr lang="en-US" smtClean="0"/>
+              <a:rPr lang="en-US"/>
               <a:t>Fifth level</a:t>
             </a:r>
-            <a:endParaRPr lang="en-US"/>
           </a:p>
         </p:txBody>
       </p:sp>
@@ -1351,7 +1355,7 @@
           <a:p>
             <a:fld id="{5BCAD085-E8A6-8845-BD4E-CB4CCA059FC4}" type="datetimeFigureOut">
               <a:rPr lang="en-US" smtClean="0"/>
-              <a:t>1/27/13</a:t>
+              <a:t>6/10/24</a:t>
             </a:fld>
             <a:endParaRPr lang="en-US"/>
           </a:p>
@@ -1449,10 +1453,9 @@
           </a:lstStyle>
           <a:p>
             <a:r>
-              <a:rPr lang="en-US" smtClean="0"/>
+              <a:rPr lang="en-US"/>
               <a:t>Click to edit Master title style</a:t>
             </a:r>
-            <a:endParaRPr lang="en-US"/>
           </a:p>
         </p:txBody>
       </p:sp>
@@ -1515,7 +1518,7 @@
           <a:p>
             <a:pPr lvl="0"/>
             <a:r>
-              <a:rPr lang="en-US" smtClean="0"/>
+              <a:rPr lang="en-US"/>
               <a:t>Click to edit Master text styles</a:t>
             </a:r>
           </a:p>
@@ -1571,38 +1574,37 @@
           <a:p>
             <a:pPr lvl="0"/>
             <a:r>
-              <a:rPr lang="en-US" smtClean="0"/>
+              <a:rPr lang="en-US"/>
               <a:t>Click to edit Master text styles</a:t>
             </a:r>
           </a:p>
           <a:p>
             <a:pPr lvl="1"/>
             <a:r>
-              <a:rPr lang="en-US" smtClean="0"/>
+              <a:rPr lang="en-US"/>
               <a:t>Second level</a:t>
             </a:r>
           </a:p>
           <a:p>
             <a:pPr lvl="2"/>
             <a:r>
-              <a:rPr lang="en-US" smtClean="0"/>
+              <a:rPr lang="en-US"/>
               <a:t>Third level</a:t>
             </a:r>
           </a:p>
           <a:p>
             <a:pPr lvl="3"/>
             <a:r>
-              <a:rPr lang="en-US" smtClean="0"/>
+              <a:rPr lang="en-US"/>
               <a:t>Fourth level</a:t>
             </a:r>
           </a:p>
           <a:p>
             <a:pPr lvl="4"/>
             <a:r>
-              <a:rPr lang="en-US" smtClean="0"/>
+              <a:rPr lang="en-US"/>
               <a:t>Fifth level</a:t>
             </a:r>
-            <a:endParaRPr lang="en-US"/>
           </a:p>
         </p:txBody>
       </p:sp>
@@ -1665,7 +1667,7 @@
           <a:p>
             <a:pPr lvl="0"/>
             <a:r>
-              <a:rPr lang="en-US" smtClean="0"/>
+              <a:rPr lang="en-US"/>
               <a:t>Click to edit Master text styles</a:t>
             </a:r>
           </a:p>
@@ -1721,38 +1723,37 @@
           <a:p>
             <a:pPr lvl="0"/>
             <a:r>
-              <a:rPr lang="en-US" smtClean="0"/>
+              <a:rPr lang="en-US"/>
               <a:t>Click to edit Master text styles</a:t>
             </a:r>
           </a:p>
           <a:p>
             <a:pPr lvl="1"/>
             <a:r>
-              <a:rPr lang="en-US" smtClean="0"/>
+              <a:rPr lang="en-US"/>
               <a:t>Second level</a:t>
             </a:r>
           </a:p>
           <a:p>
             <a:pPr lvl="2"/>
             <a:r>
-              <a:rPr lang="en-US" smtClean="0"/>
+              <a:rPr lang="en-US"/>
               <a:t>Third level</a:t>
             </a:r>
           </a:p>
           <a:p>
             <a:pPr lvl="3"/>
             <a:r>
-              <a:rPr lang="en-US" smtClean="0"/>
+              <a:rPr lang="en-US"/>
               <a:t>Fourth level</a:t>
             </a:r>
           </a:p>
           <a:p>
             <a:pPr lvl="4"/>
             <a:r>
-              <a:rPr lang="en-US" smtClean="0"/>
+              <a:rPr lang="en-US"/>
               <a:t>Fifth level</a:t>
             </a:r>
-            <a:endParaRPr lang="en-US"/>
           </a:p>
         </p:txBody>
       </p:sp>
@@ -1773,7 +1774,7 @@
           <a:p>
             <a:fld id="{5BCAD085-E8A6-8845-BD4E-CB4CCA059FC4}" type="datetimeFigureOut">
               <a:rPr lang="en-US" smtClean="0"/>
-              <a:t>1/27/13</a:t>
+              <a:t>6/10/24</a:t>
             </a:fld>
             <a:endParaRPr lang="en-US"/>
           </a:p>
@@ -1867,10 +1868,9 @@
           <a:lstStyle/>
           <a:p>
             <a:r>
-              <a:rPr lang="en-US" smtClean="0"/>
+              <a:rPr lang="en-US"/>
               <a:t>Click to edit Master title style</a:t>
             </a:r>
-            <a:endParaRPr lang="en-US"/>
           </a:p>
         </p:txBody>
       </p:sp>
@@ -1891,7 +1891,7 @@
           <a:p>
             <a:fld id="{5BCAD085-E8A6-8845-BD4E-CB4CCA059FC4}" type="datetimeFigureOut">
               <a:rPr lang="en-US" smtClean="0"/>
-              <a:t>1/27/13</a:t>
+              <a:t>6/10/24</a:t>
             </a:fld>
             <a:endParaRPr lang="en-US"/>
           </a:p>
@@ -1986,7 +1986,7 @@
           <a:p>
             <a:fld id="{5BCAD085-E8A6-8845-BD4E-CB4CCA059FC4}" type="datetimeFigureOut">
               <a:rPr lang="en-US" smtClean="0"/>
-              <a:t>1/27/13</a:t>
+              <a:t>6/10/24</a:t>
             </a:fld>
             <a:endParaRPr lang="en-US"/>
           </a:p>
@@ -2089,10 +2089,9 @@
           </a:lstStyle>
           <a:p>
             <a:r>
-              <a:rPr lang="en-US" smtClean="0"/>
+              <a:rPr lang="en-US"/>
               <a:t>Click to edit Master title style</a:t>
             </a:r>
-            <a:endParaRPr lang="en-US"/>
           </a:p>
         </p:txBody>
       </p:sp>
@@ -2146,38 +2145,37 @@
           <a:p>
             <a:pPr lvl="0"/>
             <a:r>
-              <a:rPr lang="en-US" smtClean="0"/>
+              <a:rPr lang="en-US"/>
               <a:t>Click to edit Master text styles</a:t>
             </a:r>
           </a:p>
           <a:p>
             <a:pPr lvl="1"/>
             <a:r>
-              <a:rPr lang="en-US" smtClean="0"/>
+              <a:rPr lang="en-US"/>
               <a:t>Second level</a:t>
             </a:r>
           </a:p>
           <a:p>
             <a:pPr lvl="2"/>
             <a:r>
-              <a:rPr lang="en-US" smtClean="0"/>
+              <a:rPr lang="en-US"/>
               <a:t>Third level</a:t>
             </a:r>
           </a:p>
           <a:p>
             <a:pPr lvl="3"/>
             <a:r>
-              <a:rPr lang="en-US" smtClean="0"/>
+              <a:rPr lang="en-US"/>
               <a:t>Fourth level</a:t>
             </a:r>
           </a:p>
           <a:p>
             <a:pPr lvl="4"/>
             <a:r>
-              <a:rPr lang="en-US" smtClean="0"/>
+              <a:rPr lang="en-US"/>
               <a:t>Fifth level</a:t>
             </a:r>
-            <a:endParaRPr lang="en-US"/>
           </a:p>
         </p:txBody>
       </p:sp>
@@ -2240,7 +2238,7 @@
           <a:p>
             <a:pPr lvl="0"/>
             <a:r>
-              <a:rPr lang="en-US" smtClean="0"/>
+              <a:rPr lang="en-US"/>
               <a:t>Click to edit Master text styles</a:t>
             </a:r>
           </a:p>
@@ -2263,7 +2261,7 @@
           <a:p>
             <a:fld id="{5BCAD085-E8A6-8845-BD4E-CB4CCA059FC4}" type="datetimeFigureOut">
               <a:rPr lang="en-US" smtClean="0"/>
-              <a:t>1/27/13</a:t>
+              <a:t>6/10/24</a:t>
             </a:fld>
             <a:endParaRPr lang="en-US"/>
           </a:p>
@@ -2366,10 +2364,9 @@
           </a:lstStyle>
           <a:p>
             <a:r>
-              <a:rPr lang="en-US" smtClean="0"/>
+              <a:rPr lang="en-US"/>
               <a:t>Click to edit Master title style</a:t>
             </a:r>
-            <a:endParaRPr lang="en-US"/>
           </a:p>
         </p:txBody>
       </p:sp>
@@ -2493,7 +2490,7 @@
           <a:p>
             <a:pPr lvl="0"/>
             <a:r>
-              <a:rPr lang="en-US" smtClean="0"/>
+              <a:rPr lang="en-US"/>
               <a:t>Click to edit Master text styles</a:t>
             </a:r>
           </a:p>
@@ -2516,7 +2513,7 @@
           <a:p>
             <a:fld id="{5BCAD085-E8A6-8845-BD4E-CB4CCA059FC4}" type="datetimeFigureOut">
               <a:rPr lang="en-US" smtClean="0"/>
-              <a:t>1/27/13</a:t>
+              <a:t>6/10/24</a:t>
             </a:fld>
             <a:endParaRPr lang="en-US"/>
           </a:p>
@@ -2625,10 +2622,9 @@
           <a:lstStyle/>
           <a:p>
             <a:r>
-              <a:rPr lang="en-US" smtClean="0"/>
+              <a:rPr lang="en-US"/>
               <a:t>Click to edit Master title style</a:t>
             </a:r>
-            <a:endParaRPr lang="en-US"/>
           </a:p>
         </p:txBody>
       </p:sp>
@@ -2659,38 +2655,37 @@
           <a:p>
             <a:pPr lvl="0"/>
             <a:r>
-              <a:rPr lang="en-US" smtClean="0"/>
+              <a:rPr lang="en-US"/>
               <a:t>Click to edit Master text styles</a:t>
             </a:r>
           </a:p>
           <a:p>
             <a:pPr lvl="1"/>
             <a:r>
-              <a:rPr lang="en-US" smtClean="0"/>
+              <a:rPr lang="en-US"/>
               <a:t>Second level</a:t>
             </a:r>
           </a:p>
           <a:p>
             <a:pPr lvl="2"/>
             <a:r>
-              <a:rPr lang="en-US" smtClean="0"/>
+              <a:rPr lang="en-US"/>
               <a:t>Third level</a:t>
             </a:r>
           </a:p>
           <a:p>
             <a:pPr lvl="3"/>
             <a:r>
-              <a:rPr lang="en-US" smtClean="0"/>
+              <a:rPr lang="en-US"/>
               <a:t>Fourth level</a:t>
             </a:r>
           </a:p>
           <a:p>
             <a:pPr lvl="4"/>
             <a:r>
-              <a:rPr lang="en-US" smtClean="0"/>
+              <a:rPr lang="en-US"/>
               <a:t>Fifth level</a:t>
             </a:r>
-            <a:endParaRPr lang="en-US"/>
           </a:p>
         </p:txBody>
       </p:sp>
@@ -2729,7 +2724,7 @@
           <a:p>
             <a:fld id="{5BCAD085-E8A6-8845-BD4E-CB4CCA059FC4}" type="datetimeFigureOut">
               <a:rPr lang="en-US" smtClean="0"/>
-              <a:t>1/27/13</a:t>
+              <a:t>6/10/24</a:t>
             </a:fld>
             <a:endParaRPr lang="en-US"/>
           </a:p>
@@ -2810,6 +2805,53 @@
               <a:t>‹#›</a:t>
             </a:fld>
             <a:endParaRPr lang="en-US"/>
+          </a:p>
+        </p:txBody>
+      </p:sp>
+      <p:sp>
+        <p:nvSpPr>
+          <p:cNvPr id="8" name="TextBox 7">
+            <a:extLst>
+              <a:ext uri="{FF2B5EF4-FFF2-40B4-BE49-F238E27FC236}">
+                <a16:creationId xmlns:a16="http://schemas.microsoft.com/office/drawing/2014/main" id="{423A3943-E299-031A-7790-5C082AF11DD0}"/>
+              </a:ext>
+            </a:extLst>
+          </p:cNvPr>
+          <p:cNvSpPr txBox="1"/>
+          <p:nvPr userDrawn="1">
+            <p:extLst>
+              <p:ext uri="{1162E1C5-73C7-4A58-AE30-91384D911F3F}">
+                <p184:classification xmlns:p184="http://schemas.microsoft.com/office/powerpoint/2018/4/main" val="ftr"/>
+              </p:ext>
+            </p:extLst>
+          </p:nvPr>
+        </p:nvSpPr>
+        <p:spPr>
+          <a:xfrm>
+            <a:off x="7710488" y="6459220"/>
+            <a:ext cx="1433512" cy="335280"/>
+          </a:xfrm>
+          <a:prstGeom prst="rect">
+            <a:avLst/>
+          </a:prstGeom>
+        </p:spPr>
+        <p:txBody>
+          <a:bodyPr horzOverflow="overflow" lIns="0" tIns="0" rIns="0" bIns="0">
+            <a:spAutoFit/>
+          </a:bodyPr>
+          <a:lstStyle/>
+          <a:p>
+            <a:pPr algn="l"/>
+            <a:r>
+              <a:rPr lang="en-US" sz="2200">
+                <a:solidFill>
+                  <a:srgbClr val="FF8939"/>
+                </a:solidFill>
+                <a:latin typeface="Calibri" panose="020F0502020204030204" pitchFamily="34" charset="0"/>
+                <a:cs typeface="Calibri" panose="020F0502020204030204" pitchFamily="34" charset="0"/>
+              </a:rPr>
+              <a:t>RESTRICTED</a:t>
+            </a:r>
           </a:p>
         </p:txBody>
       </p:sp>
@@ -3088,7 +3130,7 @@
 </file>
 
 <file path=ppt/slides/slide1.xml><?xml version="1.0" encoding="utf-8"?>
-<p:sld xmlns:a="http://schemas.openxmlformats.org/drawingml/2006/main" xmlns:p="http://schemas.openxmlformats.org/presentationml/2006/main" xmlns:r="http://schemas.openxmlformats.org/officeDocument/2006/relationships">
+<p:sld xmlns:a="http://schemas.openxmlformats.org/drawingml/2006/main" xmlns:r="http://schemas.openxmlformats.org/officeDocument/2006/relationships" xmlns:p="http://schemas.openxmlformats.org/presentationml/2006/main">
   <p:cSld>
     <p:spTree>
       <p:nvGrpSpPr>
@@ -3096,7 +3138,14 @@
         <p:cNvGrpSpPr/>
         <p:nvPr/>
       </p:nvGrpSpPr>
-      <p:grpSpPr/>
+      <p:grpSpPr>
+        <a:xfrm>
+          <a:off x="0" y="0"/>
+          <a:ext cx="0" cy="0"/>
+          <a:chOff x="0" y="0"/>
+          <a:chExt cx="0" cy="0"/>
+        </a:xfrm>
+      </p:grpSpPr>
       <p:sp>
         <p:nvSpPr>
           <p:cNvPr id="2" name="Title 1"/>
@@ -3139,6 +3188,30 @@
           </a:p>
         </p:txBody>
       </p:sp>
+      <p:pic>
+        <p:nvPicPr>
+          <p:cNvPr id="4" name="Picture 3" descr="four_leaf_clover.png"/>
+          <p:cNvPicPr>
+            <a:picLocks noChangeAspect="1"/>
+          </p:cNvPicPr>
+          <p:nvPr/>
+        </p:nvPicPr>
+        <p:blipFill>
+          <a:blip r:embed="rId2"/>
+          <a:stretch>
+            <a:fillRect/>
+          </a:stretch>
+        </p:blipFill>
+        <p:spPr>
+          <a:xfrm>
+            <a:off x="720443" y="4724400"/>
+            <a:ext cx="1302313" cy="1828800"/>
+          </a:xfrm>
+          <a:prstGeom prst="rect">
+            <a:avLst/>
+          </a:prstGeom>
+        </p:spPr>
+      </p:pic>
     </p:spTree>
   </p:cSld>
   <p:clrMapOvr>
@@ -3148,7 +3221,7 @@
 </file>
 
 <file path=ppt/slides/slide10.xml><?xml version="1.0" encoding="utf-8"?>
-<p:sld xmlns:a="http://schemas.openxmlformats.org/drawingml/2006/main" xmlns:p="http://schemas.openxmlformats.org/presentationml/2006/main" xmlns:r="http://schemas.openxmlformats.org/officeDocument/2006/relationships">
+<p:sld xmlns:a="http://schemas.openxmlformats.org/drawingml/2006/main" xmlns:r="http://schemas.openxmlformats.org/officeDocument/2006/relationships" xmlns:p="http://schemas.openxmlformats.org/presentationml/2006/main">
   <p:cSld>
     <p:spTree>
       <p:nvGrpSpPr>
@@ -3156,7 +3229,14 @@
         <p:cNvGrpSpPr/>
         <p:nvPr/>
       </p:nvGrpSpPr>
-      <p:grpSpPr/>
+      <p:grpSpPr>
+        <a:xfrm>
+          <a:off x="0" y="0"/>
+          <a:ext cx="0" cy="0"/>
+          <a:chOff x="0" y="0"/>
+          <a:chExt cx="0" cy="0"/>
+        </a:xfrm>
+      </p:grpSpPr>
       <p:sp>
         <p:nvSpPr>
           <p:cNvPr id="2" name="Title 1"/>
@@ -3213,7 +3293,7 @@
 </file>
 
 <file path=ppt/slides/slide2.xml><?xml version="1.0" encoding="utf-8"?>
-<p:sld xmlns:a="http://schemas.openxmlformats.org/drawingml/2006/main" xmlns:p="http://schemas.openxmlformats.org/presentationml/2006/main" xmlns:r="http://schemas.openxmlformats.org/officeDocument/2006/relationships">
+<p:sld xmlns:a="http://schemas.openxmlformats.org/drawingml/2006/main" xmlns:r="http://schemas.openxmlformats.org/officeDocument/2006/relationships" xmlns:p="http://schemas.openxmlformats.org/presentationml/2006/main">
   <p:cSld>
     <p:spTree>
       <p:nvGrpSpPr>
@@ -3221,7 +3301,14 @@
         <p:cNvGrpSpPr/>
         <p:nvPr/>
       </p:nvGrpSpPr>
-      <p:grpSpPr/>
+      <p:grpSpPr>
+        <a:xfrm>
+          <a:off x="0" y="0"/>
+          <a:ext cx="0" cy="0"/>
+          <a:chOff x="0" y="0"/>
+          <a:chExt cx="0" cy="0"/>
+        </a:xfrm>
+      </p:grpSpPr>
       <p:sp>
         <p:nvSpPr>
           <p:cNvPr id="2" name="Title 1"/>
@@ -3283,7 +3370,7 @@
 </file>
 
 <file path=ppt/slides/slide3.xml><?xml version="1.0" encoding="utf-8"?>
-<p:sld xmlns:a="http://schemas.openxmlformats.org/drawingml/2006/main" xmlns:p="http://schemas.openxmlformats.org/presentationml/2006/main" xmlns:r="http://schemas.openxmlformats.org/officeDocument/2006/relationships">
+<p:sld xmlns:a="http://schemas.openxmlformats.org/drawingml/2006/main" xmlns:r="http://schemas.openxmlformats.org/officeDocument/2006/relationships" xmlns:p="http://schemas.openxmlformats.org/presentationml/2006/main">
   <p:cSld>
     <p:spTree>
       <p:nvGrpSpPr>
@@ -3291,7 +3378,14 @@
         <p:cNvGrpSpPr/>
         <p:nvPr/>
       </p:nvGrpSpPr>
-      <p:grpSpPr/>
+      <p:grpSpPr>
+        <a:xfrm>
+          <a:off x="0" y="0"/>
+          <a:ext cx="0" cy="0"/>
+          <a:chOff x="0" y="0"/>
+          <a:chExt cx="0" cy="0"/>
+        </a:xfrm>
+      </p:grpSpPr>
       <p:sp>
         <p:nvSpPr>
           <p:cNvPr id="2" name="Title 1"/>
@@ -3322,7 +3416,7 @@
 </file>
 
 <file path=ppt/slides/slide4.xml><?xml version="1.0" encoding="utf-8"?>
-<p:sld xmlns:a="http://schemas.openxmlformats.org/drawingml/2006/main" xmlns:p="http://schemas.openxmlformats.org/presentationml/2006/main" xmlns:r="http://schemas.openxmlformats.org/officeDocument/2006/relationships">
+<p:sld xmlns:a="http://schemas.openxmlformats.org/drawingml/2006/main" xmlns:r="http://schemas.openxmlformats.org/officeDocument/2006/relationships" xmlns:p="http://schemas.openxmlformats.org/presentationml/2006/main">
   <p:cSld>
     <p:spTree>
       <p:nvGrpSpPr>
@@ -3330,7 +3424,14 @@
         <p:cNvGrpSpPr/>
         <p:nvPr/>
       </p:nvGrpSpPr>
-      <p:grpSpPr/>
+      <p:grpSpPr>
+        <a:xfrm>
+          <a:off x="0" y="0"/>
+          <a:ext cx="0" cy="0"/>
+          <a:chOff x="0" y="0"/>
+          <a:chExt cx="0" cy="0"/>
+        </a:xfrm>
+      </p:grpSpPr>
       <p:sp>
         <p:nvSpPr>
           <p:cNvPr id="2" name="Title 1"/>
@@ -3361,7 +3462,7 @@
 </file>
 
 <file path=ppt/slides/slide5.xml><?xml version="1.0" encoding="utf-8"?>
-<p:sld xmlns:a="http://schemas.openxmlformats.org/drawingml/2006/main" xmlns:p="http://schemas.openxmlformats.org/presentationml/2006/main" xmlns:r="http://schemas.openxmlformats.org/officeDocument/2006/relationships">
+<p:sld xmlns:a="http://schemas.openxmlformats.org/drawingml/2006/main" xmlns:r="http://schemas.openxmlformats.org/officeDocument/2006/relationships" xmlns:p="http://schemas.openxmlformats.org/presentationml/2006/main">
   <p:cSld>
     <p:spTree>
       <p:nvGrpSpPr>
@@ -3369,7 +3470,14 @@
         <p:cNvGrpSpPr/>
         <p:nvPr/>
       </p:nvGrpSpPr>
-      <p:grpSpPr/>
+      <p:grpSpPr>
+        <a:xfrm>
+          <a:off x="0" y="0"/>
+          <a:ext cx="0" cy="0"/>
+          <a:chOff x="0" y="0"/>
+          <a:chExt cx="0" cy="0"/>
+        </a:xfrm>
+      </p:grpSpPr>
       <p:sp>
         <p:nvSpPr>
           <p:cNvPr id="2" name="Title 1"/>
@@ -3431,7 +3539,7 @@
 </file>
 
 <file path=ppt/slides/slide6.xml><?xml version="1.0" encoding="utf-8"?>
-<p:sld xmlns:a="http://schemas.openxmlformats.org/drawingml/2006/main" xmlns:p="http://schemas.openxmlformats.org/presentationml/2006/main" xmlns:r="http://schemas.openxmlformats.org/officeDocument/2006/relationships">
+<p:sld xmlns:a="http://schemas.openxmlformats.org/drawingml/2006/main" xmlns:r="http://schemas.openxmlformats.org/officeDocument/2006/relationships" xmlns:p="http://schemas.openxmlformats.org/presentationml/2006/main">
   <p:cSld>
     <p:spTree>
       <p:nvGrpSpPr>
@@ -3439,7 +3547,14 @@
         <p:cNvGrpSpPr/>
         <p:nvPr/>
       </p:nvGrpSpPr>
-      <p:grpSpPr/>
+      <p:grpSpPr>
+        <a:xfrm>
+          <a:off x="0" y="0"/>
+          <a:ext cx="0" cy="0"/>
+          <a:chOff x="0" y="0"/>
+          <a:chExt cx="0" cy="0"/>
+        </a:xfrm>
+      </p:grpSpPr>
       <p:sp>
         <p:nvSpPr>
           <p:cNvPr id="2" name="Title 1"/>
@@ -3485,7 +3600,9 @@
               <a:t>from Bio import Entrez, SeqIO</a:t>
             </a:r>
           </a:p>
-          <a:p/>
+          <a:p>
+            <a:endParaRPr/>
+          </a:p>
           <a:p>
             <a:r>
               <a:t>def fetch_sequence(gene_id):</a:t>
@@ -3517,7 +3634,7 @@
 </file>
 
 <file path=ppt/slides/slide7.xml><?xml version="1.0" encoding="utf-8"?>
-<p:sld xmlns:a="http://schemas.openxmlformats.org/drawingml/2006/main" xmlns:p="http://schemas.openxmlformats.org/presentationml/2006/main" xmlns:r="http://schemas.openxmlformats.org/officeDocument/2006/relationships">
+<p:sld xmlns:a="http://schemas.openxmlformats.org/drawingml/2006/main" xmlns:r="http://schemas.openxmlformats.org/officeDocument/2006/relationships" xmlns:p="http://schemas.openxmlformats.org/presentationml/2006/main">
   <p:cSld>
     <p:spTree>
       <p:nvGrpSpPr>
@@ -3525,7 +3642,14 @@
         <p:cNvGrpSpPr/>
         <p:nvPr/>
       </p:nvGrpSpPr>
-      <p:grpSpPr/>
+      <p:grpSpPr>
+        <a:xfrm>
+          <a:off x="0" y="0"/>
+          <a:ext cx="0" cy="0"/>
+          <a:chOff x="0" y="0"/>
+          <a:chExt cx="0" cy="0"/>
+        </a:xfrm>
+      </p:grpSpPr>
       <p:sp>
         <p:nvSpPr>
           <p:cNvPr id="2" name="Title 1"/>
@@ -3556,7 +3680,7 @@
 </file>
 
 <file path=ppt/slides/slide8.xml><?xml version="1.0" encoding="utf-8"?>
-<p:sld xmlns:a="http://schemas.openxmlformats.org/drawingml/2006/main" xmlns:p="http://schemas.openxmlformats.org/presentationml/2006/main" xmlns:r="http://schemas.openxmlformats.org/officeDocument/2006/relationships">
+<p:sld xmlns:a="http://schemas.openxmlformats.org/drawingml/2006/main" xmlns:r="http://schemas.openxmlformats.org/officeDocument/2006/relationships" xmlns:p="http://schemas.openxmlformats.org/presentationml/2006/main">
   <p:cSld>
     <p:spTree>
       <p:nvGrpSpPr>
@@ -3564,7 +3688,14 @@
         <p:cNvGrpSpPr/>
         <p:nvPr/>
       </p:nvGrpSpPr>
-      <p:grpSpPr/>
+      <p:grpSpPr>
+        <a:xfrm>
+          <a:off x="0" y="0"/>
+          <a:ext cx="0" cy="0"/>
+          <a:chOff x="0" y="0"/>
+          <a:chExt cx="0" cy="0"/>
+        </a:xfrm>
+      </p:grpSpPr>
       <p:sp>
         <p:nvSpPr>
           <p:cNvPr id="2" name="Title 1"/>
@@ -3595,7 +3726,7 @@
 </file>
 
 <file path=ppt/slides/slide9.xml><?xml version="1.0" encoding="utf-8"?>
-<p:sld xmlns:a="http://schemas.openxmlformats.org/drawingml/2006/main" xmlns:p="http://schemas.openxmlformats.org/presentationml/2006/main" xmlns:r="http://schemas.openxmlformats.org/officeDocument/2006/relationships">
+<p:sld xmlns:a="http://schemas.openxmlformats.org/drawingml/2006/main" xmlns:r="http://schemas.openxmlformats.org/officeDocument/2006/relationships" xmlns:p="http://schemas.openxmlformats.org/presentationml/2006/main">
   <p:cSld>
     <p:spTree>
       <p:nvGrpSpPr>
@@ -3603,7 +3734,14 @@
         <p:cNvGrpSpPr/>
         <p:nvPr/>
       </p:nvGrpSpPr>
-      <p:grpSpPr/>
+      <p:grpSpPr>
+        <a:xfrm>
+          <a:off x="0" y="0"/>
+          <a:ext cx="0" cy="0"/>
+          <a:chOff x="0" y="0"/>
+          <a:chExt cx="0" cy="0"/>
+        </a:xfrm>
+      </p:grpSpPr>
       <p:sp>
         <p:nvSpPr>
           <p:cNvPr id="2" name="Title 1"/>

</xml_diff>